<commit_message>
added a lot of thing (on track to pass)
</commit_message>
<xml_diff>
--- a/docs/separate_files/presentatie.pptx
+++ b/docs/separate_files/presentatie.pptx
@@ -14,12 +14,11 @@
     <p:sldId id="276" r:id="rId8"/>
     <p:sldId id="261" r:id="rId9"/>
     <p:sldId id="272" r:id="rId10"/>
-    <p:sldId id="273" r:id="rId11"/>
-    <p:sldId id="274" r:id="rId12"/>
-    <p:sldId id="268" r:id="rId13"/>
-    <p:sldId id="271" r:id="rId14"/>
-    <p:sldId id="266" r:id="rId15"/>
-    <p:sldId id="267" r:id="rId16"/>
+    <p:sldId id="274" r:id="rId11"/>
+    <p:sldId id="268" r:id="rId12"/>
+    <p:sldId id="271" r:id="rId13"/>
+    <p:sldId id="266" r:id="rId14"/>
+    <p:sldId id="267" r:id="rId15"/>
   </p:sldIdLst>
   <p:sldSz cx="12192000" cy="6858000"/>
   <p:notesSz cx="6858000" cy="9144000"/>
@@ -350,7 +349,7 @@
           <a:p>
             <a:fld id="{3F996D42-8D81-49F8-BC08-1AAF95896406}" type="datetimeFigureOut">
               <a:rPr lang="nl-BE" smtClean="0"/>
-              <a:t>9/01/2019</a:t>
+              <a:t>14/01/2019</a:t>
             </a:fld>
             <a:endParaRPr lang="nl-BE"/>
           </a:p>
@@ -520,7 +519,7 @@
           <a:p>
             <a:fld id="{3F996D42-8D81-49F8-BC08-1AAF95896406}" type="datetimeFigureOut">
               <a:rPr lang="nl-BE" smtClean="0"/>
-              <a:t>9/01/2019</a:t>
+              <a:t>14/01/2019</a:t>
             </a:fld>
             <a:endParaRPr lang="nl-BE"/>
           </a:p>
@@ -700,7 +699,7 @@
           <a:p>
             <a:fld id="{3F996D42-8D81-49F8-BC08-1AAF95896406}" type="datetimeFigureOut">
               <a:rPr lang="nl-BE" smtClean="0"/>
-              <a:t>9/01/2019</a:t>
+              <a:t>14/01/2019</a:t>
             </a:fld>
             <a:endParaRPr lang="nl-BE"/>
           </a:p>
@@ -870,7 +869,7 @@
           <a:p>
             <a:fld id="{3F996D42-8D81-49F8-BC08-1AAF95896406}" type="datetimeFigureOut">
               <a:rPr lang="nl-BE" smtClean="0"/>
-              <a:t>9/01/2019</a:t>
+              <a:t>14/01/2019</a:t>
             </a:fld>
             <a:endParaRPr lang="nl-BE"/>
           </a:p>
@@ -1128,7 +1127,7 @@
           <a:p>
             <a:fld id="{3F996D42-8D81-49F8-BC08-1AAF95896406}" type="datetimeFigureOut">
               <a:rPr lang="nl-BE" smtClean="0"/>
-              <a:t>9/01/2019</a:t>
+              <a:t>14/01/2019</a:t>
             </a:fld>
             <a:endParaRPr lang="nl-BE"/>
           </a:p>
@@ -1416,7 +1415,7 @@
           <a:p>
             <a:fld id="{3F996D42-8D81-49F8-BC08-1AAF95896406}" type="datetimeFigureOut">
               <a:rPr lang="nl-BE" smtClean="0"/>
-              <a:t>9/01/2019</a:t>
+              <a:t>14/01/2019</a:t>
             </a:fld>
             <a:endParaRPr lang="nl-BE"/>
           </a:p>
@@ -1858,7 +1857,7 @@
           <a:p>
             <a:fld id="{3F996D42-8D81-49F8-BC08-1AAF95896406}" type="datetimeFigureOut">
               <a:rPr lang="nl-BE" smtClean="0"/>
-              <a:t>9/01/2019</a:t>
+              <a:t>14/01/2019</a:t>
             </a:fld>
             <a:endParaRPr lang="nl-BE"/>
           </a:p>
@@ -1976,7 +1975,7 @@
           <a:p>
             <a:fld id="{3F996D42-8D81-49F8-BC08-1AAF95896406}" type="datetimeFigureOut">
               <a:rPr lang="nl-BE" smtClean="0"/>
-              <a:t>9/01/2019</a:t>
+              <a:t>14/01/2019</a:t>
             </a:fld>
             <a:endParaRPr lang="nl-BE"/>
           </a:p>
@@ -2071,7 +2070,7 @@
           <a:p>
             <a:fld id="{3F996D42-8D81-49F8-BC08-1AAF95896406}" type="datetimeFigureOut">
               <a:rPr lang="nl-BE" smtClean="0"/>
-              <a:t>9/01/2019</a:t>
+              <a:t>14/01/2019</a:t>
             </a:fld>
             <a:endParaRPr lang="nl-BE"/>
           </a:p>
@@ -2359,7 +2358,7 @@
           <a:p>
             <a:fld id="{3F996D42-8D81-49F8-BC08-1AAF95896406}" type="datetimeFigureOut">
               <a:rPr lang="nl-BE" smtClean="0"/>
-              <a:t>9/01/2019</a:t>
+              <a:t>14/01/2019</a:t>
             </a:fld>
             <a:endParaRPr lang="nl-BE"/>
           </a:p>
@@ -2632,7 +2631,7 @@
           <a:p>
             <a:fld id="{3F996D42-8D81-49F8-BC08-1AAF95896406}" type="datetimeFigureOut">
               <a:rPr lang="nl-BE" smtClean="0"/>
-              <a:t>9/01/2019</a:t>
+              <a:t>14/01/2019</a:t>
             </a:fld>
             <a:endParaRPr lang="nl-BE"/>
           </a:p>
@@ -2929,7 +2928,7 @@
           <a:p>
             <a:fld id="{3F996D42-8D81-49F8-BC08-1AAF95896406}" type="datetimeFigureOut">
               <a:rPr lang="nl-BE" smtClean="0"/>
-              <a:t>9/01/2019</a:t>
+              <a:t>14/01/2019</a:t>
             </a:fld>
             <a:endParaRPr lang="nl-BE"/>
           </a:p>
@@ -3530,7 +3529,7 @@
           <p:cNvPr id="2" name="Titel 1">
             <a:extLst>
               <a:ext uri="{FF2B5EF4-FFF2-40B4-BE49-F238E27FC236}">
-                <a16:creationId xmlns:a16="http://schemas.microsoft.com/office/drawing/2014/main" id="{4178F6D0-6FA0-4FB4-8CCB-F3F52200336D}"/>
+                <a16:creationId xmlns:a16="http://schemas.microsoft.com/office/drawing/2014/main" id="{F99B9068-5938-4AF7-BE45-757DBBE4D6CA}"/>
               </a:ext>
             </a:extLst>
           </p:cNvPr>
@@ -3552,10 +3551,10 @@
       </p:sp>
       <p:pic>
         <p:nvPicPr>
-          <p:cNvPr id="6" name="Afbeelding 5">
+          <p:cNvPr id="4" name="Afbeelding 3">
             <a:extLst>
               <a:ext uri="{FF2B5EF4-FFF2-40B4-BE49-F238E27FC236}">
-                <a16:creationId xmlns:a16="http://schemas.microsoft.com/office/drawing/2014/main" id="{6273F82A-EDE6-4093-B306-01DC34F3E28C}"/>
+                <a16:creationId xmlns:a16="http://schemas.microsoft.com/office/drawing/2014/main" id="{A4B48CE9-4655-4F5B-943A-EFA08CF352E2}"/>
               </a:ext>
             </a:extLst>
           </p:cNvPr>
@@ -3578,8 +3577,8 @@
         </p:blipFill>
         <p:spPr>
           <a:xfrm>
-            <a:off x="624139" y="0"/>
-            <a:ext cx="3484756" cy="6858000"/>
+            <a:off x="532146" y="0"/>
+            <a:ext cx="3571875" cy="6848475"/>
           </a:xfrm>
           <a:prstGeom prst="rect">
             <a:avLst/>
@@ -3588,10 +3587,10 @@
       </p:pic>
       <p:pic>
         <p:nvPicPr>
-          <p:cNvPr id="7" name="Afbeelding 6">
+          <p:cNvPr id="9" name="Tijdelijke aanduiding voor inhoud 5">
             <a:extLst>
               <a:ext uri="{FF2B5EF4-FFF2-40B4-BE49-F238E27FC236}">
-                <a16:creationId xmlns:a16="http://schemas.microsoft.com/office/drawing/2014/main" id="{F904C232-EB61-4AF2-AD58-665FE2280640}"/>
+                <a16:creationId xmlns:a16="http://schemas.microsoft.com/office/drawing/2014/main" id="{66C91525-3980-4D4C-9DDF-0A1A73C1E5C3}"/>
               </a:ext>
             </a:extLst>
           </p:cNvPr>
@@ -3614,7 +3613,68 @@
         </p:blipFill>
         <p:spPr>
           <a:xfrm>
-            <a:off x="4511232" y="0"/>
+            <a:off x="8817013" y="-567"/>
+            <a:ext cx="2931952" cy="6849042"/>
+          </a:xfrm>
+          <a:prstGeom prst="rect">
+            <a:avLst/>
+          </a:prstGeom>
+        </p:spPr>
+      </p:pic>
+      <p:sp>
+        <p:nvSpPr>
+          <p:cNvPr id="3" name="Tijdelijke aanduiding voor inhoud 2">
+            <a:extLst>
+              <a:ext uri="{FF2B5EF4-FFF2-40B4-BE49-F238E27FC236}">
+                <a16:creationId xmlns:a16="http://schemas.microsoft.com/office/drawing/2014/main" id="{F5A9DFAD-A27C-4965-8C0C-2C5E45271F43}"/>
+              </a:ext>
+            </a:extLst>
+          </p:cNvPr>
+          <p:cNvSpPr>
+            <a:spLocks noGrp="1"/>
+          </p:cNvSpPr>
+          <p:nvPr>
+            <p:ph idx="1"/>
+          </p:nvPr>
+        </p:nvSpPr>
+        <p:spPr/>
+        <p:txBody>
+          <a:bodyPr/>
+          <a:lstStyle/>
+          <a:p>
+            <a:endParaRPr lang="nl-BE"/>
+          </a:p>
+        </p:txBody>
+      </p:sp>
+      <p:pic>
+        <p:nvPicPr>
+          <p:cNvPr id="7" name="Afbeelding 6">
+            <a:extLst>
+              <a:ext uri="{FF2B5EF4-FFF2-40B4-BE49-F238E27FC236}">
+                <a16:creationId xmlns:a16="http://schemas.microsoft.com/office/drawing/2014/main" id="{C94F411B-74C6-4A9C-9293-9EA977978ADD}"/>
+              </a:ext>
+            </a:extLst>
+          </p:cNvPr>
+          <p:cNvPicPr>
+            <a:picLocks noChangeAspect="1"/>
+          </p:cNvPicPr>
+          <p:nvPr/>
+        </p:nvPicPr>
+        <p:blipFill>
+          <a:blip r:embed="rId4">
+            <a:extLst>
+              <a:ext uri="{28A0092B-C50C-407E-A947-70E740481C1C}">
+                <a14:useLocalDpi xmlns:a14="http://schemas.microsoft.com/office/drawing/2010/main" val="0"/>
+              </a:ext>
+            </a:extLst>
+          </a:blip>
+          <a:stretch>
+            <a:fillRect/>
+          </a:stretch>
+        </p:blipFill>
+        <p:spPr>
+          <a:xfrm>
+            <a:off x="4680641" y="-567"/>
             <a:ext cx="3571875" cy="5448300"/>
           </a:xfrm>
           <a:prstGeom prst="rect">
@@ -3625,7 +3685,7 @@
     </p:spTree>
     <p:extLst>
       <p:ext uri="{BB962C8B-B14F-4D97-AF65-F5344CB8AC3E}">
-        <p14:creationId xmlns:p14="http://schemas.microsoft.com/office/powerpoint/2010/main" val="3943376357"/>
+        <p14:creationId xmlns:p14="http://schemas.microsoft.com/office/powerpoint/2010/main" val="1991045316"/>
       </p:ext>
     </p:extLst>
   </p:cSld>
@@ -3657,168 +3717,6 @@
           <p:cNvPr id="2" name="Titel 1">
             <a:extLst>
               <a:ext uri="{FF2B5EF4-FFF2-40B4-BE49-F238E27FC236}">
-                <a16:creationId xmlns:a16="http://schemas.microsoft.com/office/drawing/2014/main" id="{F99B9068-5938-4AF7-BE45-757DBBE4D6CA}"/>
-              </a:ext>
-            </a:extLst>
-          </p:cNvPr>
-          <p:cNvSpPr>
-            <a:spLocks noGrp="1"/>
-          </p:cNvSpPr>
-          <p:nvPr>
-            <p:ph type="title"/>
-          </p:nvPr>
-        </p:nvSpPr>
-        <p:spPr/>
-        <p:txBody>
-          <a:bodyPr/>
-          <a:lstStyle/>
-          <a:p>
-            <a:endParaRPr lang="nl-BE"/>
-          </a:p>
-        </p:txBody>
-      </p:sp>
-      <p:pic>
-        <p:nvPicPr>
-          <p:cNvPr id="6" name="Tijdelijke aanduiding voor inhoud 5">
-            <a:extLst>
-              <a:ext uri="{FF2B5EF4-FFF2-40B4-BE49-F238E27FC236}">
-                <a16:creationId xmlns:a16="http://schemas.microsoft.com/office/drawing/2014/main" id="{C13346DD-52C7-43CB-B0EA-D2872583B30C}"/>
-              </a:ext>
-            </a:extLst>
-          </p:cNvPr>
-          <p:cNvPicPr>
-            <a:picLocks noGrp="1" noChangeAspect="1"/>
-          </p:cNvPicPr>
-          <p:nvPr>
-            <p:ph idx="1"/>
-          </p:nvPr>
-        </p:nvPicPr>
-        <p:blipFill>
-          <a:blip r:embed="rId2">
-            <a:extLst>
-              <a:ext uri="{28A0092B-C50C-407E-A947-70E740481C1C}">
-                <a14:useLocalDpi xmlns:a14="http://schemas.microsoft.com/office/drawing/2010/main" val="0"/>
-              </a:ext>
-            </a:extLst>
-          </a:blip>
-          <a:stretch>
-            <a:fillRect/>
-          </a:stretch>
-        </p:blipFill>
-        <p:spPr>
-          <a:xfrm>
-            <a:off x="8087981" y="0"/>
-            <a:ext cx="3571875" cy="4181475"/>
-          </a:xfrm>
-        </p:spPr>
-      </p:pic>
-      <p:pic>
-        <p:nvPicPr>
-          <p:cNvPr id="4" name="Afbeelding 3">
-            <a:extLst>
-              <a:ext uri="{FF2B5EF4-FFF2-40B4-BE49-F238E27FC236}">
-                <a16:creationId xmlns:a16="http://schemas.microsoft.com/office/drawing/2014/main" id="{A4B48CE9-4655-4F5B-943A-EFA08CF352E2}"/>
-              </a:ext>
-            </a:extLst>
-          </p:cNvPr>
-          <p:cNvPicPr>
-            <a:picLocks noChangeAspect="1"/>
-          </p:cNvPicPr>
-          <p:nvPr/>
-        </p:nvPicPr>
-        <p:blipFill>
-          <a:blip r:embed="rId3">
-            <a:extLst>
-              <a:ext uri="{28A0092B-C50C-407E-A947-70E740481C1C}">
-                <a14:useLocalDpi xmlns:a14="http://schemas.microsoft.com/office/drawing/2010/main" val="0"/>
-              </a:ext>
-            </a:extLst>
-          </a:blip>
-          <a:stretch>
-            <a:fillRect/>
-          </a:stretch>
-        </p:blipFill>
-        <p:spPr>
-          <a:xfrm>
-            <a:off x="532146" y="0"/>
-            <a:ext cx="3571875" cy="6848475"/>
-          </a:xfrm>
-          <a:prstGeom prst="rect">
-            <a:avLst/>
-          </a:prstGeom>
-        </p:spPr>
-      </p:pic>
-      <p:pic>
-        <p:nvPicPr>
-          <p:cNvPr id="9" name="Tijdelijke aanduiding voor inhoud 5">
-            <a:extLst>
-              <a:ext uri="{FF2B5EF4-FFF2-40B4-BE49-F238E27FC236}">
-                <a16:creationId xmlns:a16="http://schemas.microsoft.com/office/drawing/2014/main" id="{66C91525-3980-4D4C-9DDF-0A1A73C1E5C3}"/>
-              </a:ext>
-            </a:extLst>
-          </p:cNvPr>
-          <p:cNvPicPr>
-            <a:picLocks noChangeAspect="1"/>
-          </p:cNvPicPr>
-          <p:nvPr/>
-        </p:nvPicPr>
-        <p:blipFill>
-          <a:blip r:embed="rId4">
-            <a:extLst>
-              <a:ext uri="{28A0092B-C50C-407E-A947-70E740481C1C}">
-                <a14:useLocalDpi xmlns:a14="http://schemas.microsoft.com/office/drawing/2010/main" val="0"/>
-              </a:ext>
-            </a:extLst>
-          </a:blip>
-          <a:stretch>
-            <a:fillRect/>
-          </a:stretch>
-        </p:blipFill>
-        <p:spPr>
-          <a:xfrm>
-            <a:off x="4630024" y="0"/>
-            <a:ext cx="2931952" cy="6849042"/>
-          </a:xfrm>
-          <a:prstGeom prst="rect">
-            <a:avLst/>
-          </a:prstGeom>
-        </p:spPr>
-      </p:pic>
-    </p:spTree>
-    <p:extLst>
-      <p:ext uri="{BB962C8B-B14F-4D97-AF65-F5344CB8AC3E}">
-        <p14:creationId xmlns:p14="http://schemas.microsoft.com/office/powerpoint/2010/main" val="1991045316"/>
-      </p:ext>
-    </p:extLst>
-  </p:cSld>
-  <p:clrMapOvr>
-    <a:masterClrMapping/>
-  </p:clrMapOvr>
-</p:sld>
-</file>
-
-<file path=ppt/slides/slide12.xml><?xml version="1.0" encoding="utf-8"?>
-<p:sld xmlns:a="http://schemas.openxmlformats.org/drawingml/2006/main" xmlns:r="http://schemas.openxmlformats.org/officeDocument/2006/relationships" xmlns:p="http://schemas.openxmlformats.org/presentationml/2006/main">
-  <p:cSld>
-    <p:spTree>
-      <p:nvGrpSpPr>
-        <p:cNvPr id="1" name=""/>
-        <p:cNvGrpSpPr/>
-        <p:nvPr/>
-      </p:nvGrpSpPr>
-      <p:grpSpPr>
-        <a:xfrm>
-          <a:off x="0" y="0"/>
-          <a:ext cx="0" cy="0"/>
-          <a:chOff x="0" y="0"/>
-          <a:chExt cx="0" cy="0"/>
-        </a:xfrm>
-      </p:grpSpPr>
-      <p:sp>
-        <p:nvSpPr>
-          <p:cNvPr id="2" name="Titel 1">
-            <a:extLst>
-              <a:ext uri="{FF2B5EF4-FFF2-40B4-BE49-F238E27FC236}">
                 <a16:creationId xmlns:a16="http://schemas.microsoft.com/office/drawing/2014/main" id="{D4C17A96-9FFB-46D3-AAB6-D72DB4F595CD}"/>
               </a:ext>
             </a:extLst>
@@ -3884,7 +3782,7 @@
 </p:sld>
 </file>
 
-<file path=ppt/slides/slide13.xml><?xml version="1.0" encoding="utf-8"?>
+<file path=ppt/slides/slide12.xml><?xml version="1.0" encoding="utf-8"?>
 <p:sld xmlns:a="http://schemas.openxmlformats.org/drawingml/2006/main" xmlns:r="http://schemas.openxmlformats.org/officeDocument/2006/relationships" xmlns:p="http://schemas.openxmlformats.org/presentationml/2006/main">
   <p:cSld>
     <p:spTree>
@@ -3974,7 +3872,7 @@
 </p:sld>
 </file>
 
-<file path=ppt/slides/slide14.xml><?xml version="1.0" encoding="utf-8"?>
+<file path=ppt/slides/slide13.xml><?xml version="1.0" encoding="utf-8"?>
 <p:sld xmlns:a="http://schemas.openxmlformats.org/drawingml/2006/main" xmlns:r="http://schemas.openxmlformats.org/officeDocument/2006/relationships" xmlns:p="http://schemas.openxmlformats.org/presentationml/2006/main">
   <p:cSld>
     <p:spTree>
@@ -3991,34 +3889,6 @@
           <a:chExt cx="0" cy="0"/>
         </a:xfrm>
       </p:grpSpPr>
-      <p:sp>
-        <p:nvSpPr>
-          <p:cNvPr id="2" name="Titel 1">
-            <a:extLst>
-              <a:ext uri="{FF2B5EF4-FFF2-40B4-BE49-F238E27FC236}">
-                <a16:creationId xmlns:a16="http://schemas.microsoft.com/office/drawing/2014/main" id="{3A836490-102F-422B-8E7D-CBA80158D565}"/>
-              </a:ext>
-            </a:extLst>
-          </p:cNvPr>
-          <p:cNvSpPr>
-            <a:spLocks noGrp="1"/>
-          </p:cNvSpPr>
-          <p:nvPr>
-            <p:ph type="title"/>
-          </p:nvPr>
-        </p:nvSpPr>
-        <p:spPr/>
-        <p:txBody>
-          <a:bodyPr/>
-          <a:lstStyle/>
-          <a:p>
-            <a:r>
-              <a:rPr lang="nl-BE" dirty="0"/>
-              <a:t>Demo</a:t>
-            </a:r>
-          </a:p>
-        </p:txBody>
-      </p:sp>
       <p:pic>
         <p:nvPicPr>
           <p:cNvPr id="5" name="Tijdelijke aanduiding voor inhoud 4">
@@ -4049,7 +3919,7 @@
         </p:blipFill>
         <p:spPr>
           <a:xfrm>
-            <a:off x="772889" y="1488281"/>
+            <a:off x="375847" y="1223586"/>
             <a:ext cx="5192073" cy="4677020"/>
           </a:xfrm>
         </p:spPr>
@@ -4083,7 +3953,7 @@
         </p:blipFill>
         <p:spPr bwMode="auto">
           <a:xfrm>
-            <a:off x="6412832" y="1492826"/>
+            <a:off x="6096000" y="1223586"/>
             <a:ext cx="5190830" cy="4755574"/>
           </a:xfrm>
           <a:prstGeom prst="rect">
@@ -4114,7 +3984,7 @@
 </p:sld>
 </file>
 
-<file path=ppt/slides/slide15.xml><?xml version="1.0" encoding="utf-8"?>
+<file path=ppt/slides/slide14.xml><?xml version="1.0" encoding="utf-8"?>
 <p:sld xmlns:a="http://schemas.openxmlformats.org/drawingml/2006/main" xmlns:r="http://schemas.openxmlformats.org/officeDocument/2006/relationships" xmlns:p="http://schemas.openxmlformats.org/presentationml/2006/main">
   <p:cSld>
     <p:spTree>
@@ -4695,10 +4565,10 @@
       </p:sp>
       <p:pic>
         <p:nvPicPr>
-          <p:cNvPr id="20" name="Afbeelding 19">
+          <p:cNvPr id="7" name="Afbeelding 6">
             <a:extLst>
               <a:ext uri="{FF2B5EF4-FFF2-40B4-BE49-F238E27FC236}">
-                <a16:creationId xmlns:a16="http://schemas.microsoft.com/office/drawing/2014/main" id="{D22D83EB-08A8-4DDD-9AD8-08687A2BFC5A}"/>
+                <a16:creationId xmlns:a16="http://schemas.microsoft.com/office/drawing/2014/main" id="{D574854B-80D7-461D-B5B2-266682C50B44}"/>
               </a:ext>
             </a:extLst>
           </p:cNvPr>
@@ -4721,43 +4591,7 @@
         </p:blipFill>
         <p:spPr>
           <a:xfrm>
-            <a:off x="2612637" y="-4572"/>
-            <a:ext cx="3288683" cy="6858000"/>
-          </a:xfrm>
-          <a:prstGeom prst="rect">
-            <a:avLst/>
-          </a:prstGeom>
-        </p:spPr>
-      </p:pic>
-      <p:pic>
-        <p:nvPicPr>
-          <p:cNvPr id="7" name="Afbeelding 6">
-            <a:extLst>
-              <a:ext uri="{FF2B5EF4-FFF2-40B4-BE49-F238E27FC236}">
-                <a16:creationId xmlns:a16="http://schemas.microsoft.com/office/drawing/2014/main" id="{D574854B-80D7-461D-B5B2-266682C50B44}"/>
-              </a:ext>
-            </a:extLst>
-          </p:cNvPr>
-          <p:cNvPicPr>
-            <a:picLocks noChangeAspect="1"/>
-          </p:cNvPicPr>
-          <p:nvPr/>
-        </p:nvPicPr>
-        <p:blipFill>
-          <a:blip r:embed="rId3">
-            <a:extLst>
-              <a:ext uri="{28A0092B-C50C-407E-A947-70E740481C1C}">
-                <a14:useLocalDpi xmlns:a14="http://schemas.microsoft.com/office/drawing/2010/main" val="0"/>
-              </a:ext>
-            </a:extLst>
-          </a:blip>
-          <a:stretch>
-            <a:fillRect/>
-          </a:stretch>
-        </p:blipFill>
-        <p:spPr>
-          <a:xfrm>
-            <a:off x="436655" y="0"/>
+            <a:off x="6028223" y="-4572"/>
             <a:ext cx="1843548" cy="6858000"/>
           </a:xfrm>
           <a:prstGeom prst="rect">
@@ -4780,7 +4614,7 @@
           <p:nvPr/>
         </p:nvPicPr>
         <p:blipFill>
-          <a:blip r:embed="rId4">
+          <a:blip r:embed="rId3">
             <a:extLst>
               <a:ext uri="{28A0092B-C50C-407E-A947-70E740481C1C}">
                 <a14:useLocalDpi xmlns:a14="http://schemas.microsoft.com/office/drawing/2010/main" val="0"/>
@@ -4793,7 +4627,7 @@
         </p:blipFill>
         <p:spPr>
           <a:xfrm>
-            <a:off x="9249611" y="-4572"/>
+            <a:off x="8508421" y="-4572"/>
             <a:ext cx="2801601" cy="5065295"/>
           </a:xfrm>
           <a:prstGeom prst="rect">
@@ -4803,22 +4637,20 @@
       </p:pic>
       <p:pic>
         <p:nvPicPr>
-          <p:cNvPr id="11" name="Tijdelijke aanduiding voor inhoud 3">
+          <p:cNvPr id="10" name="Afbeelding 9">
             <a:extLst>
               <a:ext uri="{FF2B5EF4-FFF2-40B4-BE49-F238E27FC236}">
-                <a16:creationId xmlns:a16="http://schemas.microsoft.com/office/drawing/2014/main" id="{30AC86D7-2D31-4882-9B8C-CEE9045FC433}"/>
+                <a16:creationId xmlns:a16="http://schemas.microsoft.com/office/drawing/2014/main" id="{17C9210D-7623-4888-9AB4-3907824523FA}"/>
               </a:ext>
             </a:extLst>
           </p:cNvPr>
           <p:cNvPicPr>
-            <a:picLocks noGrp="1" noChangeAspect="1"/>
+            <a:picLocks noChangeAspect="1"/>
           </p:cNvPicPr>
-          <p:nvPr>
-            <p:ph idx="1"/>
-          </p:nvPr>
+          <p:nvPr/>
         </p:nvPicPr>
         <p:blipFill>
-          <a:blip r:embed="rId5">
+          <a:blip r:embed="rId4">
             <a:extLst>
               <a:ext uri="{28A0092B-C50C-407E-A947-70E740481C1C}">
                 <a14:useLocalDpi xmlns:a14="http://schemas.microsoft.com/office/drawing/2010/main" val="0"/>
@@ -4831,8 +4663,44 @@
         </p:blipFill>
         <p:spPr>
           <a:xfrm>
-            <a:off x="6290682" y="0"/>
-            <a:ext cx="2660813" cy="3114925"/>
+            <a:off x="2949631" y="0"/>
+            <a:ext cx="2441942" cy="4343400"/>
+          </a:xfrm>
+          <a:prstGeom prst="rect">
+            <a:avLst/>
+          </a:prstGeom>
+        </p:spPr>
+      </p:pic>
+      <p:pic>
+        <p:nvPicPr>
+          <p:cNvPr id="12" name="Afbeelding 11">
+            <a:extLst>
+              <a:ext uri="{FF2B5EF4-FFF2-40B4-BE49-F238E27FC236}">
+                <a16:creationId xmlns:a16="http://schemas.microsoft.com/office/drawing/2014/main" id="{7243E04A-AFC7-4230-8009-E0C6D0264415}"/>
+              </a:ext>
+            </a:extLst>
+          </p:cNvPr>
+          <p:cNvPicPr>
+            <a:picLocks noChangeAspect="1"/>
+          </p:cNvPicPr>
+          <p:nvPr/>
+        </p:nvPicPr>
+        <p:blipFill>
+          <a:blip r:embed="rId5">
+            <a:extLst>
+              <a:ext uri="{28A0092B-C50C-407E-A947-70E740481C1C}">
+                <a14:useLocalDpi xmlns:a14="http://schemas.microsoft.com/office/drawing/2010/main" val="0"/>
+              </a:ext>
+            </a:extLst>
+          </a:blip>
+          <a:stretch>
+            <a:fillRect/>
+          </a:stretch>
+        </p:blipFill>
+        <p:spPr>
+          <a:xfrm>
+            <a:off x="165269" y="0"/>
+            <a:ext cx="2441942" cy="4343400"/>
           </a:xfrm>
           <a:prstGeom prst="rect">
             <a:avLst/>
@@ -4869,46 +4737,19 @@
           <a:chExt cx="0" cy="0"/>
         </a:xfrm>
       </p:grpSpPr>
-      <p:sp>
-        <p:nvSpPr>
-          <p:cNvPr id="2" name="Titel 1">
-            <a:extLst>
-              <a:ext uri="{FF2B5EF4-FFF2-40B4-BE49-F238E27FC236}">
-                <a16:creationId xmlns:a16="http://schemas.microsoft.com/office/drawing/2014/main" id="{93E61788-E7EE-4E5A-A193-44DC31A48DFA}"/>
-              </a:ext>
-            </a:extLst>
-          </p:cNvPr>
-          <p:cNvSpPr>
-            <a:spLocks noGrp="1"/>
-          </p:cNvSpPr>
-          <p:nvPr>
-            <p:ph type="title"/>
-          </p:nvPr>
-        </p:nvSpPr>
-        <p:spPr/>
-        <p:txBody>
-          <a:bodyPr/>
-          <a:lstStyle/>
-          <a:p>
-            <a:endParaRPr lang="nl-BE"/>
-          </a:p>
-        </p:txBody>
-      </p:sp>
       <p:pic>
         <p:nvPicPr>
-          <p:cNvPr id="4" name="Tijdelijke aanduiding voor inhoud 3">
+          <p:cNvPr id="9" name="Tijdelijke aanduiding voor inhoud 3">
             <a:extLst>
               <a:ext uri="{FF2B5EF4-FFF2-40B4-BE49-F238E27FC236}">
-                <a16:creationId xmlns:a16="http://schemas.microsoft.com/office/drawing/2014/main" id="{59C66454-2A6D-4591-88A5-2C6B72753C0B}"/>
+                <a16:creationId xmlns:a16="http://schemas.microsoft.com/office/drawing/2014/main" id="{41FB1394-FB9F-4306-965F-51C16BC0C630}"/>
               </a:ext>
             </a:extLst>
           </p:cNvPr>
           <p:cNvPicPr>
-            <a:picLocks noGrp="1" noChangeAspect="1"/>
+            <a:picLocks noChangeAspect="1"/>
           </p:cNvPicPr>
-          <p:nvPr>
-            <p:ph idx="1"/>
-          </p:nvPr>
+          <p:nvPr/>
         </p:nvPicPr>
         <p:blipFill>
           <a:blip r:embed="rId2">
@@ -4924,8 +4765,8 @@
         </p:blipFill>
         <p:spPr>
           <a:xfrm>
-            <a:off x="6336246" y="0"/>
-            <a:ext cx="2319418" cy="5121275"/>
+            <a:off x="6190510" y="0"/>
+            <a:ext cx="2660813" cy="3114925"/>
           </a:xfrm>
           <a:prstGeom prst="rect">
             <a:avLst/>
@@ -4934,10 +4775,10 @@
       </p:pic>
       <p:pic>
         <p:nvPicPr>
-          <p:cNvPr id="5" name="Afbeelding 4">
+          <p:cNvPr id="10" name="Tijdelijke aanduiding voor inhoud 5">
             <a:extLst>
               <a:ext uri="{FF2B5EF4-FFF2-40B4-BE49-F238E27FC236}">
-                <a16:creationId xmlns:a16="http://schemas.microsoft.com/office/drawing/2014/main" id="{23EC63B5-794D-46CC-ADA4-52717C9B1758}"/>
+                <a16:creationId xmlns:a16="http://schemas.microsoft.com/office/drawing/2014/main" id="{316E0C3F-DBA1-4301-B36E-AAD0C913F1EA}"/>
               </a:ext>
             </a:extLst>
           </p:cNvPr>
@@ -4960,8 +4801,8 @@
         </p:blipFill>
         <p:spPr>
           <a:xfrm>
-            <a:off x="8841958" y="0"/>
-            <a:ext cx="3571875" cy="4676775"/>
+            <a:off x="8977261" y="0"/>
+            <a:ext cx="3144929" cy="3681663"/>
           </a:xfrm>
           <a:prstGeom prst="rect">
             <a:avLst/>
@@ -4970,10 +4811,10 @@
       </p:pic>
       <p:pic>
         <p:nvPicPr>
-          <p:cNvPr id="7" name="Afbeelding 6">
+          <p:cNvPr id="11" name="Afbeelding 10">
             <a:extLst>
               <a:ext uri="{FF2B5EF4-FFF2-40B4-BE49-F238E27FC236}">
-                <a16:creationId xmlns:a16="http://schemas.microsoft.com/office/drawing/2014/main" id="{FE198BF2-65D9-446F-994B-BD182AB6423C}"/>
+                <a16:creationId xmlns:a16="http://schemas.microsoft.com/office/drawing/2014/main" id="{99C1ABCF-F8ED-4515-9331-FDBC983CBCFB}"/>
               </a:ext>
             </a:extLst>
           </p:cNvPr>
@@ -4996,8 +4837,8 @@
         </p:blipFill>
         <p:spPr>
           <a:xfrm>
-            <a:off x="346943" y="-4572"/>
-            <a:ext cx="2573983" cy="6658035"/>
+            <a:off x="2775890" y="-13286"/>
+            <a:ext cx="3288683" cy="6858000"/>
           </a:xfrm>
           <a:prstGeom prst="rect">
             <a:avLst/>
@@ -5006,10 +4847,10 @@
       </p:pic>
       <p:pic>
         <p:nvPicPr>
-          <p:cNvPr id="8" name="Tijdelijke aanduiding voor inhoud 8">
+          <p:cNvPr id="12" name="Afbeelding 11">
             <a:extLst>
               <a:ext uri="{FF2B5EF4-FFF2-40B4-BE49-F238E27FC236}">
-                <a16:creationId xmlns:a16="http://schemas.microsoft.com/office/drawing/2014/main" id="{61705267-1C3D-4C9F-B778-1AF7F4FACBF2}"/>
+                <a16:creationId xmlns:a16="http://schemas.microsoft.com/office/drawing/2014/main" id="{058EE227-6266-4B00-8217-D1447DF411EB}"/>
               </a:ext>
             </a:extLst>
           </p:cNvPr>
@@ -5032,8 +4873,8 @@
         </p:blipFill>
         <p:spPr>
           <a:xfrm>
-            <a:off x="3200401" y="0"/>
-            <a:ext cx="2856370" cy="5065296"/>
+            <a:off x="69810" y="-13286"/>
+            <a:ext cx="2573983" cy="6658035"/>
           </a:xfrm>
           <a:prstGeom prst="rect">
             <a:avLst/>
@@ -5126,7 +4967,7 @@
         </p:blipFill>
         <p:spPr>
           <a:xfrm>
-            <a:off x="252919" y="-4572"/>
+            <a:off x="6315500" y="0"/>
             <a:ext cx="1556749" cy="6858000"/>
           </a:xfrm>
           <a:prstGeom prst="rect">
@@ -5136,10 +4977,10 @@
       </p:pic>
       <p:pic>
         <p:nvPicPr>
-          <p:cNvPr id="21" name="Afbeelding 20">
+          <p:cNvPr id="8" name="Afbeelding 7">
             <a:extLst>
               <a:ext uri="{FF2B5EF4-FFF2-40B4-BE49-F238E27FC236}">
-                <a16:creationId xmlns:a16="http://schemas.microsoft.com/office/drawing/2014/main" id="{0B9832A1-BC41-4F53-AE3C-D26061057523}"/>
+                <a16:creationId xmlns:a16="http://schemas.microsoft.com/office/drawing/2014/main" id="{04A6320B-11D6-416E-A074-1F65E6674B10}"/>
               </a:ext>
             </a:extLst>
           </p:cNvPr>
@@ -5162,8 +5003,8 @@
         </p:blipFill>
         <p:spPr>
           <a:xfrm>
-            <a:off x="8620125" y="0"/>
-            <a:ext cx="3571875" cy="6353175"/>
+            <a:off x="8098811" y="4572"/>
+            <a:ext cx="2624536" cy="5354053"/>
           </a:xfrm>
           <a:prstGeom prst="rect">
             <a:avLst/>
@@ -5172,17 +5013,19 @@
       </p:pic>
       <p:pic>
         <p:nvPicPr>
-          <p:cNvPr id="7" name="Afbeelding 6">
+          <p:cNvPr id="9" name="Tijdelijke aanduiding voor inhoud 3">
             <a:extLst>
               <a:ext uri="{FF2B5EF4-FFF2-40B4-BE49-F238E27FC236}">
-                <a16:creationId xmlns:a16="http://schemas.microsoft.com/office/drawing/2014/main" id="{4FDC7661-0E7A-41E8-A1EA-4356A11E54D0}"/>
+                <a16:creationId xmlns:a16="http://schemas.microsoft.com/office/drawing/2014/main" id="{F9DBA045-F908-4370-9332-A9C9051B59EA}"/>
               </a:ext>
             </a:extLst>
           </p:cNvPr>
           <p:cNvPicPr>
-            <a:picLocks noChangeAspect="1"/>
+            <a:picLocks noGrp="1" noChangeAspect="1"/>
           </p:cNvPicPr>
-          <p:nvPr/>
+          <p:nvPr>
+            <p:ph idx="1"/>
+          </p:nvPr>
         </p:nvPicPr>
         <p:blipFill>
           <a:blip r:embed="rId4">
@@ -5198,8 +5041,8 @@
         </p:blipFill>
         <p:spPr>
           <a:xfrm>
-            <a:off x="4900153" y="0"/>
-            <a:ext cx="3571875" cy="6353175"/>
+            <a:off x="183918" y="0"/>
+            <a:ext cx="2319418" cy="5121275"/>
           </a:xfrm>
           <a:prstGeom prst="rect">
             <a:avLst/>
@@ -5208,10 +5051,10 @@
       </p:pic>
       <p:pic>
         <p:nvPicPr>
-          <p:cNvPr id="8" name="Afbeelding 7">
+          <p:cNvPr id="10" name="Afbeelding 9">
             <a:extLst>
               <a:ext uri="{FF2B5EF4-FFF2-40B4-BE49-F238E27FC236}">
-                <a16:creationId xmlns:a16="http://schemas.microsoft.com/office/drawing/2014/main" id="{04A6320B-11D6-416E-A074-1F65E6674B10}"/>
+                <a16:creationId xmlns:a16="http://schemas.microsoft.com/office/drawing/2014/main" id="{368AAFDA-AC89-46B7-9B57-08D6C5E3AF69}"/>
               </a:ext>
             </a:extLst>
           </p:cNvPr>
@@ -5234,8 +5077,8 @@
         </p:blipFill>
         <p:spPr>
           <a:xfrm>
-            <a:off x="2036230" y="0"/>
-            <a:ext cx="2624536" cy="5354053"/>
+            <a:off x="2780921" y="0"/>
+            <a:ext cx="3115101" cy="4078705"/>
           </a:xfrm>
           <a:prstGeom prst="rect">
             <a:avLst/>
@@ -5325,7 +5168,7 @@
         </p:blipFill>
         <p:spPr>
           <a:xfrm>
-            <a:off x="4404239" y="0"/>
+            <a:off x="8073870" y="0"/>
             <a:ext cx="3571875" cy="6315075"/>
           </a:xfrm>
           <a:prstGeom prst="rect">
@@ -5361,8 +5204,44 @@
         </p:blipFill>
         <p:spPr>
           <a:xfrm>
-            <a:off x="745620" y="0"/>
+            <a:off x="4547599" y="-4572"/>
             <a:ext cx="2780270" cy="6858000"/>
+          </a:xfrm>
+          <a:prstGeom prst="rect">
+            <a:avLst/>
+          </a:prstGeom>
+        </p:spPr>
+      </p:pic>
+      <p:pic>
+        <p:nvPicPr>
+          <p:cNvPr id="5" name="Afbeelding 4">
+            <a:extLst>
+              <a:ext uri="{FF2B5EF4-FFF2-40B4-BE49-F238E27FC236}">
+                <a16:creationId xmlns:a16="http://schemas.microsoft.com/office/drawing/2014/main" id="{4A1EC594-BB4D-4C88-8D00-8153B00C6C4A}"/>
+              </a:ext>
+            </a:extLst>
+          </p:cNvPr>
+          <p:cNvPicPr>
+            <a:picLocks noChangeAspect="1"/>
+          </p:cNvPicPr>
+          <p:nvPr/>
+        </p:nvPicPr>
+        <p:blipFill>
+          <a:blip r:embed="rId4">
+            <a:extLst>
+              <a:ext uri="{28A0092B-C50C-407E-A947-70E740481C1C}">
+                <a14:useLocalDpi xmlns:a14="http://schemas.microsoft.com/office/drawing/2010/main" val="0"/>
+              </a:ext>
+            </a:extLst>
+          </a:blip>
+          <a:stretch>
+            <a:fillRect/>
+          </a:stretch>
+        </p:blipFill>
+        <p:spPr>
+          <a:xfrm>
+            <a:off x="546255" y="0"/>
+            <a:ext cx="3484756" cy="6858000"/>
           </a:xfrm>
           <a:prstGeom prst="rect">
             <a:avLst/>

</xml_diff>

<commit_message>
Revert "added a lot of thing (on track to pass)"
This reverts commit 52d972914959d9e1c7b1fb19b715954e8d61169d.
</commit_message>
<xml_diff>
--- a/docs/separate_files/presentatie.pptx
+++ b/docs/separate_files/presentatie.pptx
@@ -14,11 +14,12 @@
     <p:sldId id="276" r:id="rId8"/>
     <p:sldId id="261" r:id="rId9"/>
     <p:sldId id="272" r:id="rId10"/>
-    <p:sldId id="274" r:id="rId11"/>
-    <p:sldId id="268" r:id="rId12"/>
-    <p:sldId id="271" r:id="rId13"/>
-    <p:sldId id="266" r:id="rId14"/>
-    <p:sldId id="267" r:id="rId15"/>
+    <p:sldId id="273" r:id="rId11"/>
+    <p:sldId id="274" r:id="rId12"/>
+    <p:sldId id="268" r:id="rId13"/>
+    <p:sldId id="271" r:id="rId14"/>
+    <p:sldId id="266" r:id="rId15"/>
+    <p:sldId id="267" r:id="rId16"/>
   </p:sldIdLst>
   <p:sldSz cx="12192000" cy="6858000"/>
   <p:notesSz cx="6858000" cy="9144000"/>
@@ -349,7 +350,7 @@
           <a:p>
             <a:fld id="{3F996D42-8D81-49F8-BC08-1AAF95896406}" type="datetimeFigureOut">
               <a:rPr lang="nl-BE" smtClean="0"/>
-              <a:t>14/01/2019</a:t>
+              <a:t>9/01/2019</a:t>
             </a:fld>
             <a:endParaRPr lang="nl-BE"/>
           </a:p>
@@ -519,7 +520,7 @@
           <a:p>
             <a:fld id="{3F996D42-8D81-49F8-BC08-1AAF95896406}" type="datetimeFigureOut">
               <a:rPr lang="nl-BE" smtClean="0"/>
-              <a:t>14/01/2019</a:t>
+              <a:t>9/01/2019</a:t>
             </a:fld>
             <a:endParaRPr lang="nl-BE"/>
           </a:p>
@@ -699,7 +700,7 @@
           <a:p>
             <a:fld id="{3F996D42-8D81-49F8-BC08-1AAF95896406}" type="datetimeFigureOut">
               <a:rPr lang="nl-BE" smtClean="0"/>
-              <a:t>14/01/2019</a:t>
+              <a:t>9/01/2019</a:t>
             </a:fld>
             <a:endParaRPr lang="nl-BE"/>
           </a:p>
@@ -869,7 +870,7 @@
           <a:p>
             <a:fld id="{3F996D42-8D81-49F8-BC08-1AAF95896406}" type="datetimeFigureOut">
               <a:rPr lang="nl-BE" smtClean="0"/>
-              <a:t>14/01/2019</a:t>
+              <a:t>9/01/2019</a:t>
             </a:fld>
             <a:endParaRPr lang="nl-BE"/>
           </a:p>
@@ -1127,7 +1128,7 @@
           <a:p>
             <a:fld id="{3F996D42-8D81-49F8-BC08-1AAF95896406}" type="datetimeFigureOut">
               <a:rPr lang="nl-BE" smtClean="0"/>
-              <a:t>14/01/2019</a:t>
+              <a:t>9/01/2019</a:t>
             </a:fld>
             <a:endParaRPr lang="nl-BE"/>
           </a:p>
@@ -1415,7 +1416,7 @@
           <a:p>
             <a:fld id="{3F996D42-8D81-49F8-BC08-1AAF95896406}" type="datetimeFigureOut">
               <a:rPr lang="nl-BE" smtClean="0"/>
-              <a:t>14/01/2019</a:t>
+              <a:t>9/01/2019</a:t>
             </a:fld>
             <a:endParaRPr lang="nl-BE"/>
           </a:p>
@@ -1857,7 +1858,7 @@
           <a:p>
             <a:fld id="{3F996D42-8D81-49F8-BC08-1AAF95896406}" type="datetimeFigureOut">
               <a:rPr lang="nl-BE" smtClean="0"/>
-              <a:t>14/01/2019</a:t>
+              <a:t>9/01/2019</a:t>
             </a:fld>
             <a:endParaRPr lang="nl-BE"/>
           </a:p>
@@ -1975,7 +1976,7 @@
           <a:p>
             <a:fld id="{3F996D42-8D81-49F8-BC08-1AAF95896406}" type="datetimeFigureOut">
               <a:rPr lang="nl-BE" smtClean="0"/>
-              <a:t>14/01/2019</a:t>
+              <a:t>9/01/2019</a:t>
             </a:fld>
             <a:endParaRPr lang="nl-BE"/>
           </a:p>
@@ -2070,7 +2071,7 @@
           <a:p>
             <a:fld id="{3F996D42-8D81-49F8-BC08-1AAF95896406}" type="datetimeFigureOut">
               <a:rPr lang="nl-BE" smtClean="0"/>
-              <a:t>14/01/2019</a:t>
+              <a:t>9/01/2019</a:t>
             </a:fld>
             <a:endParaRPr lang="nl-BE"/>
           </a:p>
@@ -2358,7 +2359,7 @@
           <a:p>
             <a:fld id="{3F996D42-8D81-49F8-BC08-1AAF95896406}" type="datetimeFigureOut">
               <a:rPr lang="nl-BE" smtClean="0"/>
-              <a:t>14/01/2019</a:t>
+              <a:t>9/01/2019</a:t>
             </a:fld>
             <a:endParaRPr lang="nl-BE"/>
           </a:p>
@@ -2631,7 +2632,7 @@
           <a:p>
             <a:fld id="{3F996D42-8D81-49F8-BC08-1AAF95896406}" type="datetimeFigureOut">
               <a:rPr lang="nl-BE" smtClean="0"/>
-              <a:t>14/01/2019</a:t>
+              <a:t>9/01/2019</a:t>
             </a:fld>
             <a:endParaRPr lang="nl-BE"/>
           </a:p>
@@ -2928,7 +2929,7 @@
           <a:p>
             <a:fld id="{3F996D42-8D81-49F8-BC08-1AAF95896406}" type="datetimeFigureOut">
               <a:rPr lang="nl-BE" smtClean="0"/>
-              <a:t>14/01/2019</a:t>
+              <a:t>9/01/2019</a:t>
             </a:fld>
             <a:endParaRPr lang="nl-BE"/>
           </a:p>
@@ -3529,7 +3530,7 @@
           <p:cNvPr id="2" name="Titel 1">
             <a:extLst>
               <a:ext uri="{FF2B5EF4-FFF2-40B4-BE49-F238E27FC236}">
-                <a16:creationId xmlns:a16="http://schemas.microsoft.com/office/drawing/2014/main" id="{F99B9068-5938-4AF7-BE45-757DBBE4D6CA}"/>
+                <a16:creationId xmlns:a16="http://schemas.microsoft.com/office/drawing/2014/main" id="{4178F6D0-6FA0-4FB4-8CCB-F3F52200336D}"/>
               </a:ext>
             </a:extLst>
           </p:cNvPr>
@@ -3551,10 +3552,10 @@
       </p:sp>
       <p:pic>
         <p:nvPicPr>
-          <p:cNvPr id="4" name="Afbeelding 3">
+          <p:cNvPr id="6" name="Afbeelding 5">
             <a:extLst>
               <a:ext uri="{FF2B5EF4-FFF2-40B4-BE49-F238E27FC236}">
-                <a16:creationId xmlns:a16="http://schemas.microsoft.com/office/drawing/2014/main" id="{A4B48CE9-4655-4F5B-943A-EFA08CF352E2}"/>
+                <a16:creationId xmlns:a16="http://schemas.microsoft.com/office/drawing/2014/main" id="{6273F82A-EDE6-4093-B306-01DC34F3E28C}"/>
               </a:ext>
             </a:extLst>
           </p:cNvPr>
@@ -3577,8 +3578,8 @@
         </p:blipFill>
         <p:spPr>
           <a:xfrm>
-            <a:off x="532146" y="0"/>
-            <a:ext cx="3571875" cy="6848475"/>
+            <a:off x="624139" y="0"/>
+            <a:ext cx="3484756" cy="6858000"/>
           </a:xfrm>
           <a:prstGeom prst="rect">
             <a:avLst/>
@@ -3587,10 +3588,10 @@
       </p:pic>
       <p:pic>
         <p:nvPicPr>
-          <p:cNvPr id="9" name="Tijdelijke aanduiding voor inhoud 5">
+          <p:cNvPr id="7" name="Afbeelding 6">
             <a:extLst>
               <a:ext uri="{FF2B5EF4-FFF2-40B4-BE49-F238E27FC236}">
-                <a16:creationId xmlns:a16="http://schemas.microsoft.com/office/drawing/2014/main" id="{66C91525-3980-4D4C-9DDF-0A1A73C1E5C3}"/>
+                <a16:creationId xmlns:a16="http://schemas.microsoft.com/office/drawing/2014/main" id="{F904C232-EB61-4AF2-AD58-665FE2280640}"/>
               </a:ext>
             </a:extLst>
           </p:cNvPr>
@@ -3613,68 +3614,7 @@
         </p:blipFill>
         <p:spPr>
           <a:xfrm>
-            <a:off x="8817013" y="-567"/>
-            <a:ext cx="2931952" cy="6849042"/>
-          </a:xfrm>
-          <a:prstGeom prst="rect">
-            <a:avLst/>
-          </a:prstGeom>
-        </p:spPr>
-      </p:pic>
-      <p:sp>
-        <p:nvSpPr>
-          <p:cNvPr id="3" name="Tijdelijke aanduiding voor inhoud 2">
-            <a:extLst>
-              <a:ext uri="{FF2B5EF4-FFF2-40B4-BE49-F238E27FC236}">
-                <a16:creationId xmlns:a16="http://schemas.microsoft.com/office/drawing/2014/main" id="{F5A9DFAD-A27C-4965-8C0C-2C5E45271F43}"/>
-              </a:ext>
-            </a:extLst>
-          </p:cNvPr>
-          <p:cNvSpPr>
-            <a:spLocks noGrp="1"/>
-          </p:cNvSpPr>
-          <p:nvPr>
-            <p:ph idx="1"/>
-          </p:nvPr>
-        </p:nvSpPr>
-        <p:spPr/>
-        <p:txBody>
-          <a:bodyPr/>
-          <a:lstStyle/>
-          <a:p>
-            <a:endParaRPr lang="nl-BE"/>
-          </a:p>
-        </p:txBody>
-      </p:sp>
-      <p:pic>
-        <p:nvPicPr>
-          <p:cNvPr id="7" name="Afbeelding 6">
-            <a:extLst>
-              <a:ext uri="{FF2B5EF4-FFF2-40B4-BE49-F238E27FC236}">
-                <a16:creationId xmlns:a16="http://schemas.microsoft.com/office/drawing/2014/main" id="{C94F411B-74C6-4A9C-9293-9EA977978ADD}"/>
-              </a:ext>
-            </a:extLst>
-          </p:cNvPr>
-          <p:cNvPicPr>
-            <a:picLocks noChangeAspect="1"/>
-          </p:cNvPicPr>
-          <p:nvPr/>
-        </p:nvPicPr>
-        <p:blipFill>
-          <a:blip r:embed="rId4">
-            <a:extLst>
-              <a:ext uri="{28A0092B-C50C-407E-A947-70E740481C1C}">
-                <a14:useLocalDpi xmlns:a14="http://schemas.microsoft.com/office/drawing/2010/main" val="0"/>
-              </a:ext>
-            </a:extLst>
-          </a:blip>
-          <a:stretch>
-            <a:fillRect/>
-          </a:stretch>
-        </p:blipFill>
-        <p:spPr>
-          <a:xfrm>
-            <a:off x="4680641" y="-567"/>
+            <a:off x="4511232" y="0"/>
             <a:ext cx="3571875" cy="5448300"/>
           </a:xfrm>
           <a:prstGeom prst="rect">
@@ -3685,7 +3625,7 @@
     </p:spTree>
     <p:extLst>
       <p:ext uri="{BB962C8B-B14F-4D97-AF65-F5344CB8AC3E}">
-        <p14:creationId xmlns:p14="http://schemas.microsoft.com/office/powerpoint/2010/main" val="1991045316"/>
+        <p14:creationId xmlns:p14="http://schemas.microsoft.com/office/powerpoint/2010/main" val="3943376357"/>
       </p:ext>
     </p:extLst>
   </p:cSld>
@@ -3717,6 +3657,168 @@
           <p:cNvPr id="2" name="Titel 1">
             <a:extLst>
               <a:ext uri="{FF2B5EF4-FFF2-40B4-BE49-F238E27FC236}">
+                <a16:creationId xmlns:a16="http://schemas.microsoft.com/office/drawing/2014/main" id="{F99B9068-5938-4AF7-BE45-757DBBE4D6CA}"/>
+              </a:ext>
+            </a:extLst>
+          </p:cNvPr>
+          <p:cNvSpPr>
+            <a:spLocks noGrp="1"/>
+          </p:cNvSpPr>
+          <p:nvPr>
+            <p:ph type="title"/>
+          </p:nvPr>
+        </p:nvSpPr>
+        <p:spPr/>
+        <p:txBody>
+          <a:bodyPr/>
+          <a:lstStyle/>
+          <a:p>
+            <a:endParaRPr lang="nl-BE"/>
+          </a:p>
+        </p:txBody>
+      </p:sp>
+      <p:pic>
+        <p:nvPicPr>
+          <p:cNvPr id="6" name="Tijdelijke aanduiding voor inhoud 5">
+            <a:extLst>
+              <a:ext uri="{FF2B5EF4-FFF2-40B4-BE49-F238E27FC236}">
+                <a16:creationId xmlns:a16="http://schemas.microsoft.com/office/drawing/2014/main" id="{C13346DD-52C7-43CB-B0EA-D2872583B30C}"/>
+              </a:ext>
+            </a:extLst>
+          </p:cNvPr>
+          <p:cNvPicPr>
+            <a:picLocks noGrp="1" noChangeAspect="1"/>
+          </p:cNvPicPr>
+          <p:nvPr>
+            <p:ph idx="1"/>
+          </p:nvPr>
+        </p:nvPicPr>
+        <p:blipFill>
+          <a:blip r:embed="rId2">
+            <a:extLst>
+              <a:ext uri="{28A0092B-C50C-407E-A947-70E740481C1C}">
+                <a14:useLocalDpi xmlns:a14="http://schemas.microsoft.com/office/drawing/2010/main" val="0"/>
+              </a:ext>
+            </a:extLst>
+          </a:blip>
+          <a:stretch>
+            <a:fillRect/>
+          </a:stretch>
+        </p:blipFill>
+        <p:spPr>
+          <a:xfrm>
+            <a:off x="8087981" y="0"/>
+            <a:ext cx="3571875" cy="4181475"/>
+          </a:xfrm>
+        </p:spPr>
+      </p:pic>
+      <p:pic>
+        <p:nvPicPr>
+          <p:cNvPr id="4" name="Afbeelding 3">
+            <a:extLst>
+              <a:ext uri="{FF2B5EF4-FFF2-40B4-BE49-F238E27FC236}">
+                <a16:creationId xmlns:a16="http://schemas.microsoft.com/office/drawing/2014/main" id="{A4B48CE9-4655-4F5B-943A-EFA08CF352E2}"/>
+              </a:ext>
+            </a:extLst>
+          </p:cNvPr>
+          <p:cNvPicPr>
+            <a:picLocks noChangeAspect="1"/>
+          </p:cNvPicPr>
+          <p:nvPr/>
+        </p:nvPicPr>
+        <p:blipFill>
+          <a:blip r:embed="rId3">
+            <a:extLst>
+              <a:ext uri="{28A0092B-C50C-407E-A947-70E740481C1C}">
+                <a14:useLocalDpi xmlns:a14="http://schemas.microsoft.com/office/drawing/2010/main" val="0"/>
+              </a:ext>
+            </a:extLst>
+          </a:blip>
+          <a:stretch>
+            <a:fillRect/>
+          </a:stretch>
+        </p:blipFill>
+        <p:spPr>
+          <a:xfrm>
+            <a:off x="532146" y="0"/>
+            <a:ext cx="3571875" cy="6848475"/>
+          </a:xfrm>
+          <a:prstGeom prst="rect">
+            <a:avLst/>
+          </a:prstGeom>
+        </p:spPr>
+      </p:pic>
+      <p:pic>
+        <p:nvPicPr>
+          <p:cNvPr id="9" name="Tijdelijke aanduiding voor inhoud 5">
+            <a:extLst>
+              <a:ext uri="{FF2B5EF4-FFF2-40B4-BE49-F238E27FC236}">
+                <a16:creationId xmlns:a16="http://schemas.microsoft.com/office/drawing/2014/main" id="{66C91525-3980-4D4C-9DDF-0A1A73C1E5C3}"/>
+              </a:ext>
+            </a:extLst>
+          </p:cNvPr>
+          <p:cNvPicPr>
+            <a:picLocks noChangeAspect="1"/>
+          </p:cNvPicPr>
+          <p:nvPr/>
+        </p:nvPicPr>
+        <p:blipFill>
+          <a:blip r:embed="rId4">
+            <a:extLst>
+              <a:ext uri="{28A0092B-C50C-407E-A947-70E740481C1C}">
+                <a14:useLocalDpi xmlns:a14="http://schemas.microsoft.com/office/drawing/2010/main" val="0"/>
+              </a:ext>
+            </a:extLst>
+          </a:blip>
+          <a:stretch>
+            <a:fillRect/>
+          </a:stretch>
+        </p:blipFill>
+        <p:spPr>
+          <a:xfrm>
+            <a:off x="4630024" y="0"/>
+            <a:ext cx="2931952" cy="6849042"/>
+          </a:xfrm>
+          <a:prstGeom prst="rect">
+            <a:avLst/>
+          </a:prstGeom>
+        </p:spPr>
+      </p:pic>
+    </p:spTree>
+    <p:extLst>
+      <p:ext uri="{BB962C8B-B14F-4D97-AF65-F5344CB8AC3E}">
+        <p14:creationId xmlns:p14="http://schemas.microsoft.com/office/powerpoint/2010/main" val="1991045316"/>
+      </p:ext>
+    </p:extLst>
+  </p:cSld>
+  <p:clrMapOvr>
+    <a:masterClrMapping/>
+  </p:clrMapOvr>
+</p:sld>
+</file>
+
+<file path=ppt/slides/slide12.xml><?xml version="1.0" encoding="utf-8"?>
+<p:sld xmlns:a="http://schemas.openxmlformats.org/drawingml/2006/main" xmlns:r="http://schemas.openxmlformats.org/officeDocument/2006/relationships" xmlns:p="http://schemas.openxmlformats.org/presentationml/2006/main">
+  <p:cSld>
+    <p:spTree>
+      <p:nvGrpSpPr>
+        <p:cNvPr id="1" name=""/>
+        <p:cNvGrpSpPr/>
+        <p:nvPr/>
+      </p:nvGrpSpPr>
+      <p:grpSpPr>
+        <a:xfrm>
+          <a:off x="0" y="0"/>
+          <a:ext cx="0" cy="0"/>
+          <a:chOff x="0" y="0"/>
+          <a:chExt cx="0" cy="0"/>
+        </a:xfrm>
+      </p:grpSpPr>
+      <p:sp>
+        <p:nvSpPr>
+          <p:cNvPr id="2" name="Titel 1">
+            <a:extLst>
+              <a:ext uri="{FF2B5EF4-FFF2-40B4-BE49-F238E27FC236}">
                 <a16:creationId xmlns:a16="http://schemas.microsoft.com/office/drawing/2014/main" id="{D4C17A96-9FFB-46D3-AAB6-D72DB4F595CD}"/>
               </a:ext>
             </a:extLst>
@@ -3782,7 +3884,7 @@
 </p:sld>
 </file>
 
-<file path=ppt/slides/slide12.xml><?xml version="1.0" encoding="utf-8"?>
+<file path=ppt/slides/slide13.xml><?xml version="1.0" encoding="utf-8"?>
 <p:sld xmlns:a="http://schemas.openxmlformats.org/drawingml/2006/main" xmlns:r="http://schemas.openxmlformats.org/officeDocument/2006/relationships" xmlns:p="http://schemas.openxmlformats.org/presentationml/2006/main">
   <p:cSld>
     <p:spTree>
@@ -3872,7 +3974,7 @@
 </p:sld>
 </file>
 
-<file path=ppt/slides/slide13.xml><?xml version="1.0" encoding="utf-8"?>
+<file path=ppt/slides/slide14.xml><?xml version="1.0" encoding="utf-8"?>
 <p:sld xmlns:a="http://schemas.openxmlformats.org/drawingml/2006/main" xmlns:r="http://schemas.openxmlformats.org/officeDocument/2006/relationships" xmlns:p="http://schemas.openxmlformats.org/presentationml/2006/main">
   <p:cSld>
     <p:spTree>
@@ -3889,6 +3991,34 @@
           <a:chExt cx="0" cy="0"/>
         </a:xfrm>
       </p:grpSpPr>
+      <p:sp>
+        <p:nvSpPr>
+          <p:cNvPr id="2" name="Titel 1">
+            <a:extLst>
+              <a:ext uri="{FF2B5EF4-FFF2-40B4-BE49-F238E27FC236}">
+                <a16:creationId xmlns:a16="http://schemas.microsoft.com/office/drawing/2014/main" id="{3A836490-102F-422B-8E7D-CBA80158D565}"/>
+              </a:ext>
+            </a:extLst>
+          </p:cNvPr>
+          <p:cNvSpPr>
+            <a:spLocks noGrp="1"/>
+          </p:cNvSpPr>
+          <p:nvPr>
+            <p:ph type="title"/>
+          </p:nvPr>
+        </p:nvSpPr>
+        <p:spPr/>
+        <p:txBody>
+          <a:bodyPr/>
+          <a:lstStyle/>
+          <a:p>
+            <a:r>
+              <a:rPr lang="nl-BE" dirty="0"/>
+              <a:t>Demo</a:t>
+            </a:r>
+          </a:p>
+        </p:txBody>
+      </p:sp>
       <p:pic>
         <p:nvPicPr>
           <p:cNvPr id="5" name="Tijdelijke aanduiding voor inhoud 4">
@@ -3919,7 +4049,7 @@
         </p:blipFill>
         <p:spPr>
           <a:xfrm>
-            <a:off x="375847" y="1223586"/>
+            <a:off x="772889" y="1488281"/>
             <a:ext cx="5192073" cy="4677020"/>
           </a:xfrm>
         </p:spPr>
@@ -3953,7 +4083,7 @@
         </p:blipFill>
         <p:spPr bwMode="auto">
           <a:xfrm>
-            <a:off x="6096000" y="1223586"/>
+            <a:off x="6412832" y="1492826"/>
             <a:ext cx="5190830" cy="4755574"/>
           </a:xfrm>
           <a:prstGeom prst="rect">
@@ -3984,7 +4114,7 @@
 </p:sld>
 </file>
 
-<file path=ppt/slides/slide14.xml><?xml version="1.0" encoding="utf-8"?>
+<file path=ppt/slides/slide15.xml><?xml version="1.0" encoding="utf-8"?>
 <p:sld xmlns:a="http://schemas.openxmlformats.org/drawingml/2006/main" xmlns:r="http://schemas.openxmlformats.org/officeDocument/2006/relationships" xmlns:p="http://schemas.openxmlformats.org/presentationml/2006/main">
   <p:cSld>
     <p:spTree>
@@ -4565,10 +4695,10 @@
       </p:sp>
       <p:pic>
         <p:nvPicPr>
-          <p:cNvPr id="7" name="Afbeelding 6">
+          <p:cNvPr id="20" name="Afbeelding 19">
             <a:extLst>
               <a:ext uri="{FF2B5EF4-FFF2-40B4-BE49-F238E27FC236}">
-                <a16:creationId xmlns:a16="http://schemas.microsoft.com/office/drawing/2014/main" id="{D574854B-80D7-461D-B5B2-266682C50B44}"/>
+                <a16:creationId xmlns:a16="http://schemas.microsoft.com/office/drawing/2014/main" id="{D22D83EB-08A8-4DDD-9AD8-08687A2BFC5A}"/>
               </a:ext>
             </a:extLst>
           </p:cNvPr>
@@ -4591,7 +4721,43 @@
         </p:blipFill>
         <p:spPr>
           <a:xfrm>
-            <a:off x="6028223" y="-4572"/>
+            <a:off x="2612637" y="-4572"/>
+            <a:ext cx="3288683" cy="6858000"/>
+          </a:xfrm>
+          <a:prstGeom prst="rect">
+            <a:avLst/>
+          </a:prstGeom>
+        </p:spPr>
+      </p:pic>
+      <p:pic>
+        <p:nvPicPr>
+          <p:cNvPr id="7" name="Afbeelding 6">
+            <a:extLst>
+              <a:ext uri="{FF2B5EF4-FFF2-40B4-BE49-F238E27FC236}">
+                <a16:creationId xmlns:a16="http://schemas.microsoft.com/office/drawing/2014/main" id="{D574854B-80D7-461D-B5B2-266682C50B44}"/>
+              </a:ext>
+            </a:extLst>
+          </p:cNvPr>
+          <p:cNvPicPr>
+            <a:picLocks noChangeAspect="1"/>
+          </p:cNvPicPr>
+          <p:nvPr/>
+        </p:nvPicPr>
+        <p:blipFill>
+          <a:blip r:embed="rId3">
+            <a:extLst>
+              <a:ext uri="{28A0092B-C50C-407E-A947-70E740481C1C}">
+                <a14:useLocalDpi xmlns:a14="http://schemas.microsoft.com/office/drawing/2010/main" val="0"/>
+              </a:ext>
+            </a:extLst>
+          </a:blip>
+          <a:stretch>
+            <a:fillRect/>
+          </a:stretch>
+        </p:blipFill>
+        <p:spPr>
+          <a:xfrm>
+            <a:off x="436655" y="0"/>
             <a:ext cx="1843548" cy="6858000"/>
           </a:xfrm>
           <a:prstGeom prst="rect">
@@ -4614,7 +4780,7 @@
           <p:nvPr/>
         </p:nvPicPr>
         <p:blipFill>
-          <a:blip r:embed="rId3">
+          <a:blip r:embed="rId4">
             <a:extLst>
               <a:ext uri="{28A0092B-C50C-407E-A947-70E740481C1C}">
                 <a14:useLocalDpi xmlns:a14="http://schemas.microsoft.com/office/drawing/2010/main" val="0"/>
@@ -4627,7 +4793,7 @@
         </p:blipFill>
         <p:spPr>
           <a:xfrm>
-            <a:off x="8508421" y="-4572"/>
+            <a:off x="9249611" y="-4572"/>
             <a:ext cx="2801601" cy="5065295"/>
           </a:xfrm>
           <a:prstGeom prst="rect">
@@ -4637,20 +4803,22 @@
       </p:pic>
       <p:pic>
         <p:nvPicPr>
-          <p:cNvPr id="10" name="Afbeelding 9">
+          <p:cNvPr id="11" name="Tijdelijke aanduiding voor inhoud 3">
             <a:extLst>
               <a:ext uri="{FF2B5EF4-FFF2-40B4-BE49-F238E27FC236}">
-                <a16:creationId xmlns:a16="http://schemas.microsoft.com/office/drawing/2014/main" id="{17C9210D-7623-4888-9AB4-3907824523FA}"/>
+                <a16:creationId xmlns:a16="http://schemas.microsoft.com/office/drawing/2014/main" id="{30AC86D7-2D31-4882-9B8C-CEE9045FC433}"/>
               </a:ext>
             </a:extLst>
           </p:cNvPr>
           <p:cNvPicPr>
-            <a:picLocks noChangeAspect="1"/>
+            <a:picLocks noGrp="1" noChangeAspect="1"/>
           </p:cNvPicPr>
-          <p:nvPr/>
+          <p:nvPr>
+            <p:ph idx="1"/>
+          </p:nvPr>
         </p:nvPicPr>
         <p:blipFill>
-          <a:blip r:embed="rId4">
+          <a:blip r:embed="rId5">
             <a:extLst>
               <a:ext uri="{28A0092B-C50C-407E-A947-70E740481C1C}">
                 <a14:useLocalDpi xmlns:a14="http://schemas.microsoft.com/office/drawing/2010/main" val="0"/>
@@ -4663,44 +4831,8 @@
         </p:blipFill>
         <p:spPr>
           <a:xfrm>
-            <a:off x="2949631" y="0"/>
-            <a:ext cx="2441942" cy="4343400"/>
-          </a:xfrm>
-          <a:prstGeom prst="rect">
-            <a:avLst/>
-          </a:prstGeom>
-        </p:spPr>
-      </p:pic>
-      <p:pic>
-        <p:nvPicPr>
-          <p:cNvPr id="12" name="Afbeelding 11">
-            <a:extLst>
-              <a:ext uri="{FF2B5EF4-FFF2-40B4-BE49-F238E27FC236}">
-                <a16:creationId xmlns:a16="http://schemas.microsoft.com/office/drawing/2014/main" id="{7243E04A-AFC7-4230-8009-E0C6D0264415}"/>
-              </a:ext>
-            </a:extLst>
-          </p:cNvPr>
-          <p:cNvPicPr>
-            <a:picLocks noChangeAspect="1"/>
-          </p:cNvPicPr>
-          <p:nvPr/>
-        </p:nvPicPr>
-        <p:blipFill>
-          <a:blip r:embed="rId5">
-            <a:extLst>
-              <a:ext uri="{28A0092B-C50C-407E-A947-70E740481C1C}">
-                <a14:useLocalDpi xmlns:a14="http://schemas.microsoft.com/office/drawing/2010/main" val="0"/>
-              </a:ext>
-            </a:extLst>
-          </a:blip>
-          <a:stretch>
-            <a:fillRect/>
-          </a:stretch>
-        </p:blipFill>
-        <p:spPr>
-          <a:xfrm>
-            <a:off x="165269" y="0"/>
-            <a:ext cx="2441942" cy="4343400"/>
+            <a:off x="6290682" y="0"/>
+            <a:ext cx="2660813" cy="3114925"/>
           </a:xfrm>
           <a:prstGeom prst="rect">
             <a:avLst/>
@@ -4737,19 +4869,46 @@
           <a:chExt cx="0" cy="0"/>
         </a:xfrm>
       </p:grpSpPr>
+      <p:sp>
+        <p:nvSpPr>
+          <p:cNvPr id="2" name="Titel 1">
+            <a:extLst>
+              <a:ext uri="{FF2B5EF4-FFF2-40B4-BE49-F238E27FC236}">
+                <a16:creationId xmlns:a16="http://schemas.microsoft.com/office/drawing/2014/main" id="{93E61788-E7EE-4E5A-A193-44DC31A48DFA}"/>
+              </a:ext>
+            </a:extLst>
+          </p:cNvPr>
+          <p:cNvSpPr>
+            <a:spLocks noGrp="1"/>
+          </p:cNvSpPr>
+          <p:nvPr>
+            <p:ph type="title"/>
+          </p:nvPr>
+        </p:nvSpPr>
+        <p:spPr/>
+        <p:txBody>
+          <a:bodyPr/>
+          <a:lstStyle/>
+          <a:p>
+            <a:endParaRPr lang="nl-BE"/>
+          </a:p>
+        </p:txBody>
+      </p:sp>
       <p:pic>
         <p:nvPicPr>
-          <p:cNvPr id="9" name="Tijdelijke aanduiding voor inhoud 3">
+          <p:cNvPr id="4" name="Tijdelijke aanduiding voor inhoud 3">
             <a:extLst>
               <a:ext uri="{FF2B5EF4-FFF2-40B4-BE49-F238E27FC236}">
-                <a16:creationId xmlns:a16="http://schemas.microsoft.com/office/drawing/2014/main" id="{41FB1394-FB9F-4306-965F-51C16BC0C630}"/>
+                <a16:creationId xmlns:a16="http://schemas.microsoft.com/office/drawing/2014/main" id="{59C66454-2A6D-4591-88A5-2C6B72753C0B}"/>
               </a:ext>
             </a:extLst>
           </p:cNvPr>
           <p:cNvPicPr>
-            <a:picLocks noChangeAspect="1"/>
+            <a:picLocks noGrp="1" noChangeAspect="1"/>
           </p:cNvPicPr>
-          <p:nvPr/>
+          <p:nvPr>
+            <p:ph idx="1"/>
+          </p:nvPr>
         </p:nvPicPr>
         <p:blipFill>
           <a:blip r:embed="rId2">
@@ -4765,8 +4924,8 @@
         </p:blipFill>
         <p:spPr>
           <a:xfrm>
-            <a:off x="6190510" y="0"/>
-            <a:ext cx="2660813" cy="3114925"/>
+            <a:off x="6336246" y="0"/>
+            <a:ext cx="2319418" cy="5121275"/>
           </a:xfrm>
           <a:prstGeom prst="rect">
             <a:avLst/>
@@ -4775,10 +4934,10 @@
       </p:pic>
       <p:pic>
         <p:nvPicPr>
-          <p:cNvPr id="10" name="Tijdelijke aanduiding voor inhoud 5">
+          <p:cNvPr id="5" name="Afbeelding 4">
             <a:extLst>
               <a:ext uri="{FF2B5EF4-FFF2-40B4-BE49-F238E27FC236}">
-                <a16:creationId xmlns:a16="http://schemas.microsoft.com/office/drawing/2014/main" id="{316E0C3F-DBA1-4301-B36E-AAD0C913F1EA}"/>
+                <a16:creationId xmlns:a16="http://schemas.microsoft.com/office/drawing/2014/main" id="{23EC63B5-794D-46CC-ADA4-52717C9B1758}"/>
               </a:ext>
             </a:extLst>
           </p:cNvPr>
@@ -4801,8 +4960,8 @@
         </p:blipFill>
         <p:spPr>
           <a:xfrm>
-            <a:off x="8977261" y="0"/>
-            <a:ext cx="3144929" cy="3681663"/>
+            <a:off x="8841958" y="0"/>
+            <a:ext cx="3571875" cy="4676775"/>
           </a:xfrm>
           <a:prstGeom prst="rect">
             <a:avLst/>
@@ -4811,10 +4970,10 @@
       </p:pic>
       <p:pic>
         <p:nvPicPr>
-          <p:cNvPr id="11" name="Afbeelding 10">
+          <p:cNvPr id="7" name="Afbeelding 6">
             <a:extLst>
               <a:ext uri="{FF2B5EF4-FFF2-40B4-BE49-F238E27FC236}">
-                <a16:creationId xmlns:a16="http://schemas.microsoft.com/office/drawing/2014/main" id="{99C1ABCF-F8ED-4515-9331-FDBC983CBCFB}"/>
+                <a16:creationId xmlns:a16="http://schemas.microsoft.com/office/drawing/2014/main" id="{FE198BF2-65D9-446F-994B-BD182AB6423C}"/>
               </a:ext>
             </a:extLst>
           </p:cNvPr>
@@ -4837,8 +4996,8 @@
         </p:blipFill>
         <p:spPr>
           <a:xfrm>
-            <a:off x="2775890" y="-13286"/>
-            <a:ext cx="3288683" cy="6858000"/>
+            <a:off x="346943" y="-4572"/>
+            <a:ext cx="2573983" cy="6658035"/>
           </a:xfrm>
           <a:prstGeom prst="rect">
             <a:avLst/>
@@ -4847,10 +5006,10 @@
       </p:pic>
       <p:pic>
         <p:nvPicPr>
-          <p:cNvPr id="12" name="Afbeelding 11">
+          <p:cNvPr id="8" name="Tijdelijke aanduiding voor inhoud 8">
             <a:extLst>
               <a:ext uri="{FF2B5EF4-FFF2-40B4-BE49-F238E27FC236}">
-                <a16:creationId xmlns:a16="http://schemas.microsoft.com/office/drawing/2014/main" id="{058EE227-6266-4B00-8217-D1447DF411EB}"/>
+                <a16:creationId xmlns:a16="http://schemas.microsoft.com/office/drawing/2014/main" id="{61705267-1C3D-4C9F-B778-1AF7F4FACBF2}"/>
               </a:ext>
             </a:extLst>
           </p:cNvPr>
@@ -4873,8 +5032,8 @@
         </p:blipFill>
         <p:spPr>
           <a:xfrm>
-            <a:off x="69810" y="-13286"/>
-            <a:ext cx="2573983" cy="6658035"/>
+            <a:off x="3200401" y="0"/>
+            <a:ext cx="2856370" cy="5065296"/>
           </a:xfrm>
           <a:prstGeom prst="rect">
             <a:avLst/>
@@ -4967,7 +5126,7 @@
         </p:blipFill>
         <p:spPr>
           <a:xfrm>
-            <a:off x="6315500" y="0"/>
+            <a:off x="252919" y="-4572"/>
             <a:ext cx="1556749" cy="6858000"/>
           </a:xfrm>
           <a:prstGeom prst="rect">
@@ -4977,10 +5136,10 @@
       </p:pic>
       <p:pic>
         <p:nvPicPr>
-          <p:cNvPr id="8" name="Afbeelding 7">
+          <p:cNvPr id="21" name="Afbeelding 20">
             <a:extLst>
               <a:ext uri="{FF2B5EF4-FFF2-40B4-BE49-F238E27FC236}">
-                <a16:creationId xmlns:a16="http://schemas.microsoft.com/office/drawing/2014/main" id="{04A6320B-11D6-416E-A074-1F65E6674B10}"/>
+                <a16:creationId xmlns:a16="http://schemas.microsoft.com/office/drawing/2014/main" id="{0B9832A1-BC41-4F53-AE3C-D26061057523}"/>
               </a:ext>
             </a:extLst>
           </p:cNvPr>
@@ -5003,8 +5162,8 @@
         </p:blipFill>
         <p:spPr>
           <a:xfrm>
-            <a:off x="8098811" y="4572"/>
-            <a:ext cx="2624536" cy="5354053"/>
+            <a:off x="8620125" y="0"/>
+            <a:ext cx="3571875" cy="6353175"/>
           </a:xfrm>
           <a:prstGeom prst="rect">
             <a:avLst/>
@@ -5013,19 +5172,17 @@
       </p:pic>
       <p:pic>
         <p:nvPicPr>
-          <p:cNvPr id="9" name="Tijdelijke aanduiding voor inhoud 3">
+          <p:cNvPr id="7" name="Afbeelding 6">
             <a:extLst>
               <a:ext uri="{FF2B5EF4-FFF2-40B4-BE49-F238E27FC236}">
-                <a16:creationId xmlns:a16="http://schemas.microsoft.com/office/drawing/2014/main" id="{F9DBA045-F908-4370-9332-A9C9051B59EA}"/>
+                <a16:creationId xmlns:a16="http://schemas.microsoft.com/office/drawing/2014/main" id="{4FDC7661-0E7A-41E8-A1EA-4356A11E54D0}"/>
               </a:ext>
             </a:extLst>
           </p:cNvPr>
           <p:cNvPicPr>
-            <a:picLocks noGrp="1" noChangeAspect="1"/>
+            <a:picLocks noChangeAspect="1"/>
           </p:cNvPicPr>
-          <p:nvPr>
-            <p:ph idx="1"/>
-          </p:nvPr>
+          <p:nvPr/>
         </p:nvPicPr>
         <p:blipFill>
           <a:blip r:embed="rId4">
@@ -5041,8 +5198,8 @@
         </p:blipFill>
         <p:spPr>
           <a:xfrm>
-            <a:off x="183918" y="0"/>
-            <a:ext cx="2319418" cy="5121275"/>
+            <a:off x="4900153" y="0"/>
+            <a:ext cx="3571875" cy="6353175"/>
           </a:xfrm>
           <a:prstGeom prst="rect">
             <a:avLst/>
@@ -5051,10 +5208,10 @@
       </p:pic>
       <p:pic>
         <p:nvPicPr>
-          <p:cNvPr id="10" name="Afbeelding 9">
+          <p:cNvPr id="8" name="Afbeelding 7">
             <a:extLst>
               <a:ext uri="{FF2B5EF4-FFF2-40B4-BE49-F238E27FC236}">
-                <a16:creationId xmlns:a16="http://schemas.microsoft.com/office/drawing/2014/main" id="{368AAFDA-AC89-46B7-9B57-08D6C5E3AF69}"/>
+                <a16:creationId xmlns:a16="http://schemas.microsoft.com/office/drawing/2014/main" id="{04A6320B-11D6-416E-A074-1F65E6674B10}"/>
               </a:ext>
             </a:extLst>
           </p:cNvPr>
@@ -5077,8 +5234,8 @@
         </p:blipFill>
         <p:spPr>
           <a:xfrm>
-            <a:off x="2780921" y="0"/>
-            <a:ext cx="3115101" cy="4078705"/>
+            <a:off x="2036230" y="0"/>
+            <a:ext cx="2624536" cy="5354053"/>
           </a:xfrm>
           <a:prstGeom prst="rect">
             <a:avLst/>
@@ -5168,7 +5325,7 @@
         </p:blipFill>
         <p:spPr>
           <a:xfrm>
-            <a:off x="8073870" y="0"/>
+            <a:off x="4404239" y="0"/>
             <a:ext cx="3571875" cy="6315075"/>
           </a:xfrm>
           <a:prstGeom prst="rect">
@@ -5204,44 +5361,8 @@
         </p:blipFill>
         <p:spPr>
           <a:xfrm>
-            <a:off x="4547599" y="-4572"/>
+            <a:off x="745620" y="0"/>
             <a:ext cx="2780270" cy="6858000"/>
-          </a:xfrm>
-          <a:prstGeom prst="rect">
-            <a:avLst/>
-          </a:prstGeom>
-        </p:spPr>
-      </p:pic>
-      <p:pic>
-        <p:nvPicPr>
-          <p:cNvPr id="5" name="Afbeelding 4">
-            <a:extLst>
-              <a:ext uri="{FF2B5EF4-FFF2-40B4-BE49-F238E27FC236}">
-                <a16:creationId xmlns:a16="http://schemas.microsoft.com/office/drawing/2014/main" id="{4A1EC594-BB4D-4C88-8D00-8153B00C6C4A}"/>
-              </a:ext>
-            </a:extLst>
-          </p:cNvPr>
-          <p:cNvPicPr>
-            <a:picLocks noChangeAspect="1"/>
-          </p:cNvPicPr>
-          <p:nvPr/>
-        </p:nvPicPr>
-        <p:blipFill>
-          <a:blip r:embed="rId4">
-            <a:extLst>
-              <a:ext uri="{28A0092B-C50C-407E-A947-70E740481C1C}">
-                <a14:useLocalDpi xmlns:a14="http://schemas.microsoft.com/office/drawing/2010/main" val="0"/>
-              </a:ext>
-            </a:extLst>
-          </a:blip>
-          <a:stretch>
-            <a:fillRect/>
-          </a:stretch>
-        </p:blipFill>
-        <p:spPr>
-          <a:xfrm>
-            <a:off x="546255" y="0"/>
-            <a:ext cx="3484756" cy="6858000"/>
           </a:xfrm>
           <a:prstGeom prst="rect">
             <a:avLst/>

</xml_diff>